<commit_message>
File content is updated.
</commit_message>
<xml_diff>
--- a/Azure Face API with Real-Time Message Broker(RTMB) Service and Plotly JS_WondeTadesse- 15 Min.pptx
+++ b/Azure Face API with Real-Time Message Broker(RTMB) Service and Plotly JS_WondeTadesse- 15 Min.pptx
@@ -271,7 +271,7 @@
               <a:pPr>
                 <a:defRPr/>
               </a:pPr>
-              <a:t>2/4/2018</a:t>
+              <a:t>2/5/2018</a:t>
             </a:fld>
             <a:endParaRPr lang="en-US"/>
           </a:p>
@@ -473,7 +473,7 @@
               <a:pPr>
                 <a:defRPr/>
               </a:pPr>
-              <a:t>2/4/2018</a:t>
+              <a:t>2/5/2018</a:t>
             </a:fld>
             <a:endParaRPr lang="en-US"/>
           </a:p>
@@ -1148,7 +1148,7 @@
               <a:pPr>
                 <a:defRPr/>
               </a:pPr>
-              <a:t>2/4/2018</a:t>
+              <a:t>2/5/2018</a:t>
             </a:fld>
             <a:endParaRPr lang="en-US"/>
           </a:p>
@@ -1346,7 +1346,7 @@
               <a:pPr>
                 <a:defRPr/>
               </a:pPr>
-              <a:t>2/4/2018</a:t>
+              <a:t>2/5/2018</a:t>
             </a:fld>
             <a:endParaRPr lang="en-US"/>
           </a:p>
@@ -1554,7 +1554,7 @@
               <a:pPr>
                 <a:defRPr/>
               </a:pPr>
-              <a:t>2/4/2018</a:t>
+              <a:t>2/5/2018</a:t>
             </a:fld>
             <a:endParaRPr lang="en-US"/>
           </a:p>
@@ -1930,7 +1930,7 @@
               <a:pPr>
                 <a:defRPr/>
               </a:pPr>
-              <a:t>2/4/2018</a:t>
+              <a:t>2/5/2018</a:t>
             </a:fld>
             <a:endParaRPr lang="en-US"/>
           </a:p>
@@ -2179,7 +2179,7 @@
               <a:pPr>
                 <a:defRPr/>
               </a:pPr>
-              <a:t>2/4/2018</a:t>
+              <a:t>2/5/2018</a:t>
             </a:fld>
             <a:endParaRPr lang="en-US"/>
           </a:p>
@@ -2454,7 +2454,7 @@
               <a:pPr>
                 <a:defRPr/>
               </a:pPr>
-              <a:t>2/4/2018</a:t>
+              <a:t>2/5/2018</a:t>
             </a:fld>
             <a:endParaRPr lang="en-US"/>
           </a:p>
@@ -2769,7 +2769,7 @@
               <a:pPr>
                 <a:defRPr/>
               </a:pPr>
-              <a:t>2/4/2018</a:t>
+              <a:t>2/5/2018</a:t>
             </a:fld>
             <a:endParaRPr lang="en-US"/>
           </a:p>
@@ -3218,7 +3218,7 @@
               <a:pPr>
                 <a:defRPr/>
               </a:pPr>
-              <a:t>2/4/2018</a:t>
+              <a:t>2/5/2018</a:t>
             </a:fld>
             <a:endParaRPr lang="en-US"/>
           </a:p>
@@ -3365,7 +3365,7 @@
               <a:pPr>
                 <a:defRPr/>
               </a:pPr>
-              <a:t>2/4/2018</a:t>
+              <a:t>2/5/2018</a:t>
             </a:fld>
             <a:endParaRPr lang="en-US"/>
           </a:p>
@@ -3490,7 +3490,7 @@
               <a:pPr>
                 <a:defRPr/>
               </a:pPr>
-              <a:t>2/4/2018</a:t>
+              <a:t>2/5/2018</a:t>
             </a:fld>
             <a:endParaRPr lang="en-US"/>
           </a:p>
@@ -3795,7 +3795,7 @@
               <a:pPr>
                 <a:defRPr/>
               </a:pPr>
-              <a:t>2/4/2018</a:t>
+              <a:t>2/5/2018</a:t>
             </a:fld>
             <a:endParaRPr lang="en-US"/>
           </a:p>
@@ -4080,7 +4080,7 @@
               <a:pPr>
                 <a:defRPr/>
               </a:pPr>
-              <a:t>2/4/2018</a:t>
+              <a:t>2/5/2018</a:t>
             </a:fld>
             <a:endParaRPr lang="en-US"/>
           </a:p>
@@ -4378,7 +4378,7 @@
               <a:pPr>
                 <a:defRPr/>
               </a:pPr>
-              <a:t>2/4/2018</a:t>
+              <a:t>2/5/2018</a:t>
             </a:fld>
             <a:endParaRPr lang="en-US"/>
           </a:p>
@@ -6614,7 +6614,7 @@
               <a:rPr lang="en-US" dirty="0">
                 <a:hlinkClick r:id="rId2"/>
               </a:rPr>
-              <a:t>Youtube link</a:t>
+              <a:t>https://www.youtube.com/watch?v=jMVeof-f_h0</a:t>
             </a:r>
             <a:endParaRPr lang="en-US" dirty="0"/>
           </a:p>
@@ -6628,7 +6628,7 @@
               <a:rPr lang="en-US" dirty="0">
                 <a:hlinkClick r:id="rId3"/>
               </a:rPr>
-              <a:t>Youtube link</a:t>
+              <a:t>https://www.youtube.com/watch?v=0-KxsNlgw_Y</a:t>
             </a:r>
             <a:endParaRPr lang="en-US" dirty="0"/>
           </a:p>
@@ -6642,7 +6642,7 @@
               <a:rPr lang="en-US" dirty="0">
                 <a:hlinkClick r:id="rId4"/>
               </a:rPr>
-              <a:t>Youtube link</a:t>
+              <a:t>https://www.youtube.com/watch?v=82sThT0N1FI</a:t>
             </a:r>
             <a:endParaRPr lang="en-US" dirty="0"/>
           </a:p>
@@ -6656,16 +6656,13 @@
             <a:pPr lvl="1"/>
             <a:r>
               <a:rPr lang="en-US" dirty="0"/>
-              <a:t>Slides and reports</a:t>
-            </a:r>
-          </a:p>
-          <a:p>
-            <a:pPr lvl="2"/>
+              <a:t>Slides : </a:t>
+            </a:r>
             <a:r>
               <a:rPr lang="en-US" dirty="0">
                 <a:hlinkClick r:id="rId5"/>
               </a:rPr>
-              <a:t>https://github.com/WondeTadesse/AzureFaceAPISampleSlides</a:t>
+              <a:t>https://github.com/wondechala/AzureFaceAPISampleSlides</a:t>
             </a:r>
             <a:r>
               <a:rPr lang="en-US" dirty="0"/>
@@ -6676,21 +6673,40 @@
             <a:pPr lvl="1"/>
             <a:r>
               <a:rPr lang="en-US" dirty="0"/>
-              <a:t>Source code</a:t>
-            </a:r>
-          </a:p>
-          <a:p>
-            <a:pPr lvl="2"/>
+              <a:t>Reports : </a:t>
+            </a:r>
             <a:r>
               <a:rPr lang="en-US" dirty="0">
                 <a:hlinkClick r:id="rId6"/>
               </a:rPr>
-              <a:t>https://github.com/WondeTadesse/AzureFaceAPISample</a:t>
+              <a:t>https://github.com/wondechala/AzureFaceAPISampleReport</a:t>
             </a:r>
             <a:r>
               <a:rPr lang="en-US" dirty="0"/>
+              <a:t> </a:t>
+            </a:r>
+          </a:p>
+          <a:p>
+            <a:pPr lvl="1"/>
+            <a:r>
+              <a:rPr lang="en-US" dirty="0"/>
+              <a:t>Source code </a:t>
+            </a:r>
+            <a:r>
+              <a:rPr lang="en-US"/>
+              <a:t>: </a:t>
+            </a:r>
+            <a:r>
+              <a:rPr lang="en-US">
+                <a:hlinkClick r:id="rId7"/>
+              </a:rPr>
+              <a:t>https://github.com/wondechala/AzureFaceAPISample</a:t>
+            </a:r>
+            <a:r>
+              <a:rPr lang="en-US"/>
               <a:t>  </a:t>
             </a:r>
+            <a:endParaRPr lang="en-US" dirty="0"/>
           </a:p>
           <a:p>
             <a:r>
@@ -6704,33 +6720,23 @@
               <a:rPr lang="en-US" dirty="0"/>
               <a:t>Azure Face API documentation - </a:t>
             </a:r>
-            <a:r>
-              <a:rPr lang="en-US" dirty="0">
-                <a:hlinkClick r:id="rId7"/>
-              </a:rPr>
-              <a:t>https://azure.microsoft.com/en-us/services/cognitive-services/face/</a:t>
-            </a:r>
-            <a:r>
-              <a:rPr lang="en-US" dirty="0"/>
-              <a:t> </a:t>
-            </a:r>
-          </a:p>
-          <a:p>
-            <a:pPr lvl="1"/>
-            <a:r>
-              <a:rPr lang="en-US" dirty="0"/>
-              <a:t>SignalR related resources  </a:t>
-            </a:r>
-          </a:p>
-          <a:p>
-            <a:pPr lvl="2"/>
             <a:r>
               <a:rPr lang="en-US" dirty="0">
                 <a:hlinkClick r:id="rId8"/>
               </a:rPr>
-              <a:t>https://www.codeproject.com/Articles/898992/RESTful-SignalR-Service</a:t>
-            </a:r>
-            <a:endParaRPr lang="en-US" dirty="0"/>
+              <a:t>https://azure.microsoft.com/en-us/services/cognitive-services/face/</a:t>
+            </a:r>
+            <a:r>
+              <a:rPr lang="en-US" dirty="0"/>
+              <a:t> </a:t>
+            </a:r>
+          </a:p>
+          <a:p>
+            <a:pPr lvl="1"/>
+            <a:r>
+              <a:rPr lang="en-US" dirty="0"/>
+              <a:t>SignalR related resources  </a:t>
+            </a:r>
           </a:p>
           <a:p>
             <a:pPr lvl="2"/>
@@ -6738,6 +6744,16 @@
               <a:rPr lang="en-US" dirty="0">
                 <a:hlinkClick r:id="rId9"/>
               </a:rPr>
+              <a:t>https://www.codeproject.com/Articles/898992/RESTful-SignalR-Service</a:t>
+            </a:r>
+            <a:endParaRPr lang="en-US" dirty="0"/>
+          </a:p>
+          <a:p>
+            <a:pPr lvl="2"/>
+            <a:r>
+              <a:rPr lang="en-US" dirty="0">
+                <a:hlinkClick r:id="rId10"/>
+              </a:rPr>
               <a:t>https://docs.microsoft.com/en-us/aspnet/signalr/overview/getting-started/introduction-to-signalr</a:t>
             </a:r>
             <a:r>
@@ -6757,7 +6773,7 @@
             </a:r>
             <a:r>
               <a:rPr lang="en-US" dirty="0">
-                <a:hlinkClick r:id="rId10"/>
+                <a:hlinkClick r:id="rId11"/>
               </a:rPr>
               <a:t>https://plot.ly/javascript/</a:t>
             </a:r>
@@ -6961,7 +6977,7 @@
                     <a:lumMod val="25000"/>
                   </a:schemeClr>
                 </a:solidFill>
-                <a:hlinkClick r:id="rId11"/>
+                <a:hlinkClick r:id="rId12"/>
               </a:rPr>
               <a:t>@</a:t>
             </a:r>
@@ -6972,7 +6988,7 @@
                     <a:lumMod val="25000"/>
                   </a:schemeClr>
                 </a:solidFill>
-                <a:hlinkClick r:id="rId11"/>
+                <a:hlinkClick r:id="rId12"/>
               </a:rPr>
               <a:t>wonde-tadesse</a:t>
             </a:r>

</xml_diff>